<commit_message>
Add quiz 4 and correct team participation survey date
</commit_message>
<xml_diff>
--- a/lectures/11-Design-Ex.pptx
+++ b/lectures/11-Design-Ex.pptx
@@ -130,7 +130,7 @@
 <file path=ppt/revisionInfo.xml><?xml version="1.0" encoding="utf-8"?>
 <p1510:revInfo xmlns:a="http://schemas.openxmlformats.org/drawingml/2006/main" xmlns:r="http://schemas.openxmlformats.org/officeDocument/2006/relationships" xmlns:p1510="http://schemas.microsoft.com/office/powerpoint/2015/10/main">
   <p1510:revLst>
-    <p1510:client id="{1D74E85E-28C0-407A-A913-98DCE76E4F20}" v="42" dt="2022-09-28T19:22:00.265"/>
+    <p1510:client id="{1D74E85E-28C0-407A-A913-98DCE76E4F20}" v="46" dt="2022-09-28T21:54:06.442"/>
     <p1510:client id="{517C8950-2BAD-494A-856F-CC7777129CD4}" v="1724" dt="2022-09-26T20:50:38.492"/>
     <p1510:client id="{DDEC0879-C63A-44E6-A741-2CD98C1A5985}" v="8" dt="2022-08-06T02:45:27.078"/>
     <p1510:client id="{E2BBAD0F-8820-4984-8E26-A262C989F684}" v="60" dt="2022-06-30T19:14:50.498"/>
@@ -3882,7 +3882,7 @@
                 <a:ea typeface="+mn-lt"/>
                 <a:cs typeface="+mn-lt"/>
               </a:rPr>
-              <a:t>Monday, Oct 3, by 11:59 PM</a:t>
+              <a:t>Monday, Oct 17, by 11:59 PM</a:t>
             </a:r>
             <a:r>
               <a:rPr lang="en-US" dirty="0">

</xml_diff>